<commit_message>
chore: update cover image
</commit_message>
<xml_diff>
--- a/docs/static/design.pptx
+++ b/docs/static/design.pptx
@@ -4470,10 +4470,7 @@
               <a:avLst/>
             </a:prstGeom>
             <a:solidFill>
-              <a:schemeClr val="accent5">
-                <a:lumMod val="40000"/>
-                <a:lumOff val="60000"/>
-              </a:schemeClr>
+              <a:schemeClr val="bg1"/>
             </a:solidFill>
             <a:ln>
               <a:noFill/>

</xml_diff>